<commit_message>
added tests for landing page and added css for website as well as handling some routing
</commit_message>
<xml_diff>
--- a/ProjectDesign/Molecule.pptx
+++ b/ProjectDesign/Molecule.pptx
@@ -284,7 +284,7 @@
           <a:p>
             <a:fld id="{23FEA57E-7C1A-457B-A4CD-5DCEB057B502}" type="datetime1">
               <a:rPr lang="en-US" smtClean="0"/>
-              <a:t>1/15/2021</a:t>
+              <a:t>1/16/2021</a:t>
             </a:fld>
             <a:endParaRPr lang="en-US" dirty="0"/>
           </a:p>
@@ -487,7 +487,7 @@
           <a:p>
             <a:fld id="{11789749-A4CD-447F-8298-2B7988C91CEA}" type="datetime1">
               <a:rPr lang="en-US" smtClean="0"/>
-              <a:t>1/15/2021</a:t>
+              <a:t>1/16/2021</a:t>
             </a:fld>
             <a:endParaRPr lang="en-US"/>
           </a:p>
@@ -698,7 +698,7 @@
           <a:p>
             <a:fld id="{BA0444D3-C0BA-4587-A56C-581AB9F841BE}" type="datetime1">
               <a:rPr lang="en-US" smtClean="0"/>
-              <a:t>1/15/2021</a:t>
+              <a:t>1/16/2021</a:t>
             </a:fld>
             <a:endParaRPr lang="en-US"/>
           </a:p>
@@ -912,7 +912,7 @@
           <a:p>
             <a:fld id="{201AF2CE-4F37-411C-A3EE-BBBE223265BF}" type="datetime1">
               <a:rPr lang="en-US" smtClean="0"/>
-              <a:t>1/15/2021</a:t>
+              <a:t>1/16/2021</a:t>
             </a:fld>
             <a:endParaRPr lang="en-US"/>
           </a:p>
@@ -1193,7 +1193,7 @@
           <a:p>
             <a:fld id="{C96083D4-708C-4BB5-B4FD-30CE9FA12FD5}" type="datetime1">
               <a:rPr lang="en-US" smtClean="0"/>
-              <a:t>1/15/2021</a:t>
+              <a:t>1/16/2021</a:t>
             </a:fld>
             <a:endParaRPr lang="en-US"/>
           </a:p>
@@ -1473,7 +1473,7 @@
           <a:p>
             <a:fld id="{D0D239B2-65BC-4C2A-A62B-3EABFE9590E4}" type="datetime1">
               <a:rPr lang="en-US" smtClean="0"/>
-              <a:t>1/15/2021</a:t>
+              <a:t>1/16/2021</a:t>
             </a:fld>
             <a:endParaRPr lang="en-US"/>
           </a:p>
@@ -1895,7 +1895,7 @@
           <a:p>
             <a:fld id="{85E05F5A-E4A3-476F-A89E-C2B73F2431E4}" type="datetime1">
               <a:rPr lang="en-US" smtClean="0"/>
-              <a:t>1/15/2021</a:t>
+              <a:t>1/16/2021</a:t>
             </a:fld>
             <a:endParaRPr lang="en-US"/>
           </a:p>
@@ -2040,7 +2040,7 @@
           <a:p>
             <a:fld id="{E3761515-4A26-4F31-9F61-5A10B1FABBFC}" type="datetime1">
               <a:rPr lang="en-US" smtClean="0"/>
-              <a:t>1/15/2021</a:t>
+              <a:t>1/16/2021</a:t>
             </a:fld>
             <a:endParaRPr lang="en-US"/>
           </a:p>
@@ -2156,7 +2156,7 @@
           <a:p>
             <a:fld id="{4A75DC65-7D1F-4BAB-9695-F7E734143E14}" type="datetime1">
               <a:rPr lang="en-US" smtClean="0"/>
-              <a:t>1/15/2021</a:t>
+              <a:t>1/16/2021</a:t>
             </a:fld>
             <a:endParaRPr lang="en-US"/>
           </a:p>
@@ -2470,7 +2470,7 @@
           <a:p>
             <a:fld id="{7E624077-BD55-4036-8E92-6558FDF3B653}" type="datetime1">
               <a:rPr lang="en-US" smtClean="0"/>
-              <a:t>1/15/2021</a:t>
+              <a:t>1/16/2021</a:t>
             </a:fld>
             <a:endParaRPr lang="en-US"/>
           </a:p>
@@ -2764,7 +2764,7 @@
           <a:p>
             <a:fld id="{804225F2-7107-4609-BCC2-77C63064A5E8}" type="datetime1">
               <a:rPr lang="en-US" smtClean="0"/>
-              <a:t>1/15/2021</a:t>
+              <a:t>1/16/2021</a:t>
             </a:fld>
             <a:endParaRPr lang="en-US"/>
           </a:p>
@@ -3012,7 +3012,7 @@
           <a:p>
             <a:fld id="{D3FE42E8-8B57-452D-A122-4DCE9AC771EF}" type="datetime1">
               <a:rPr lang="en-US" smtClean="0"/>
-              <a:t>1/15/2021</a:t>
+              <a:t>1/16/2021</a:t>
             </a:fld>
             <a:endParaRPr lang="en-US"/>
           </a:p>
@@ -16375,6 +16375,63 @@
           </a:p>
         </p:txBody>
       </p:sp>
+      <p:sp>
+        <p:nvSpPr>
+          <p:cNvPr id="11" name="Rectangle 10">
+            <a:extLst>
+              <a:ext uri="{FF2B5EF4-FFF2-40B4-BE49-F238E27FC236}">
+                <a16:creationId xmlns:a16="http://schemas.microsoft.com/office/drawing/2014/main" id="{5130D4C2-C89B-4D8D-84E9-3A72A0AEE5C3}"/>
+              </a:ext>
+            </a:extLst>
+          </p:cNvPr>
+          <p:cNvSpPr/>
+          <p:nvPr/>
+        </p:nvSpPr>
+        <p:spPr>
+          <a:xfrm>
+            <a:off x="3744737" y="5937599"/>
+            <a:ext cx="516633" cy="425473"/>
+          </a:xfrm>
+          <a:prstGeom prst="rect">
+            <a:avLst/>
+          </a:prstGeom>
+          <a:solidFill>
+            <a:schemeClr val="tx1"/>
+          </a:solidFill>
+          <a:ln>
+            <a:solidFill>
+              <a:schemeClr val="bg1"/>
+            </a:solidFill>
+          </a:ln>
+        </p:spPr>
+        <p:style>
+          <a:lnRef idx="2">
+            <a:schemeClr val="accent1">
+              <a:shade val="50000"/>
+            </a:schemeClr>
+          </a:lnRef>
+          <a:fillRef idx="1">
+            <a:schemeClr val="accent1"/>
+          </a:fillRef>
+          <a:effectRef idx="0">
+            <a:schemeClr val="accent1"/>
+          </a:effectRef>
+          <a:fontRef idx="minor">
+            <a:schemeClr val="lt1"/>
+          </a:fontRef>
+        </p:style>
+        <p:txBody>
+          <a:bodyPr rtlCol="0" anchor="ctr"/>
+          <a:lstStyle/>
+          <a:p>
+            <a:pPr algn="ctr"/>
+            <a:r>
+              <a:rPr lang="en-US" sz="1200" dirty="0"/>
+              <a:t>logo</a:t>
+            </a:r>
+          </a:p>
+        </p:txBody>
+      </p:sp>
     </p:spTree>
     <p:extLst>
       <p:ext uri="{BB962C8B-B14F-4D97-AF65-F5344CB8AC3E}">

</xml_diff>